<commit_message>
#21 Mock-up for Permission is done
</commit_message>
<xml_diff>
--- a/document/Permission mock-up.pptx
+++ b/document/Permission mock-up.pptx
@@ -6,9 +6,7 @@
   </p:sldMasterIdLst>
   <p:sldIdLst>
     <p:sldId id="259" r:id="rId2"/>
-    <p:sldId id="256" r:id="rId3"/>
-    <p:sldId id="257" r:id="rId4"/>
-    <p:sldId id="258" r:id="rId5"/>
+    <p:sldId id="258" r:id="rId3"/>
   </p:sldIdLst>
   <p:sldSz cx="12192000" cy="6858000"/>
   <p:notesSz cx="6858000" cy="9144000"/>
@@ -107,6 +105,11 @@
       </a:defRPr>
     </a:lvl9pPr>
   </p:defaultTextStyle>
+  <p:extLst>
+    <p:ext uri="{EFAFB233-063F-42B5-8137-9DF3F51BA10A}">
+      <p15:sldGuideLst xmlns:p15="http://schemas.microsoft.com/office/powerpoint/2012/main"/>
+    </p:ext>
+  </p:extLst>
 </p:presentation>
 </file>
 
@@ -257,7 +260,7 @@
           <a:p>
             <a:fld id="{CCF922D2-28BA-4741-BF87-E32CA0C16F1A}" type="datetimeFigureOut">
               <a:rPr lang="en-US" smtClean="0"/>
-              <a:t>12/24/2021</a:t>
+              <a:t>12/27/2021</a:t>
             </a:fld>
             <a:endParaRPr lang="en-US"/>
           </a:p>
@@ -455,7 +458,7 @@
           <a:p>
             <a:fld id="{CCF922D2-28BA-4741-BF87-E32CA0C16F1A}" type="datetimeFigureOut">
               <a:rPr lang="en-US" smtClean="0"/>
-              <a:t>12/24/2021</a:t>
+              <a:t>12/27/2021</a:t>
             </a:fld>
             <a:endParaRPr lang="en-US"/>
           </a:p>
@@ -663,7 +666,7 @@
           <a:p>
             <a:fld id="{CCF922D2-28BA-4741-BF87-E32CA0C16F1A}" type="datetimeFigureOut">
               <a:rPr lang="en-US" smtClean="0"/>
-              <a:t>12/24/2021</a:t>
+              <a:t>12/27/2021</a:t>
             </a:fld>
             <a:endParaRPr lang="en-US"/>
           </a:p>
@@ -861,7 +864,7 @@
           <a:p>
             <a:fld id="{CCF922D2-28BA-4741-BF87-E32CA0C16F1A}" type="datetimeFigureOut">
               <a:rPr lang="en-US" smtClean="0"/>
-              <a:t>12/24/2021</a:t>
+              <a:t>12/27/2021</a:t>
             </a:fld>
             <a:endParaRPr lang="en-US"/>
           </a:p>
@@ -1136,7 +1139,7 @@
           <a:p>
             <a:fld id="{CCF922D2-28BA-4741-BF87-E32CA0C16F1A}" type="datetimeFigureOut">
               <a:rPr lang="en-US" smtClean="0"/>
-              <a:t>12/24/2021</a:t>
+              <a:t>12/27/2021</a:t>
             </a:fld>
             <a:endParaRPr lang="en-US"/>
           </a:p>
@@ -1401,7 +1404,7 @@
           <a:p>
             <a:fld id="{CCF922D2-28BA-4741-BF87-E32CA0C16F1A}" type="datetimeFigureOut">
               <a:rPr lang="en-US" smtClean="0"/>
-              <a:t>12/24/2021</a:t>
+              <a:t>12/27/2021</a:t>
             </a:fld>
             <a:endParaRPr lang="en-US"/>
           </a:p>
@@ -1813,7 +1816,7 @@
           <a:p>
             <a:fld id="{CCF922D2-28BA-4741-BF87-E32CA0C16F1A}" type="datetimeFigureOut">
               <a:rPr lang="en-US" smtClean="0"/>
-              <a:t>12/24/2021</a:t>
+              <a:t>12/27/2021</a:t>
             </a:fld>
             <a:endParaRPr lang="en-US"/>
           </a:p>
@@ -1954,7 +1957,7 @@
           <a:p>
             <a:fld id="{CCF922D2-28BA-4741-BF87-E32CA0C16F1A}" type="datetimeFigureOut">
               <a:rPr lang="en-US" smtClean="0"/>
-              <a:t>12/24/2021</a:t>
+              <a:t>12/27/2021</a:t>
             </a:fld>
             <a:endParaRPr lang="en-US"/>
           </a:p>
@@ -2067,7 +2070,7 @@
           <a:p>
             <a:fld id="{CCF922D2-28BA-4741-BF87-E32CA0C16F1A}" type="datetimeFigureOut">
               <a:rPr lang="en-US" smtClean="0"/>
-              <a:t>12/24/2021</a:t>
+              <a:t>12/27/2021</a:t>
             </a:fld>
             <a:endParaRPr lang="en-US"/>
           </a:p>
@@ -2378,7 +2381,7 @@
           <a:p>
             <a:fld id="{CCF922D2-28BA-4741-BF87-E32CA0C16F1A}" type="datetimeFigureOut">
               <a:rPr lang="en-US" smtClean="0"/>
-              <a:t>12/24/2021</a:t>
+              <a:t>12/27/2021</a:t>
             </a:fld>
             <a:endParaRPr lang="en-US"/>
           </a:p>
@@ -2666,7 +2669,7 @@
           <a:p>
             <a:fld id="{CCF922D2-28BA-4741-BF87-E32CA0C16F1A}" type="datetimeFigureOut">
               <a:rPr lang="en-US" smtClean="0"/>
-              <a:t>12/24/2021</a:t>
+              <a:t>12/27/2021</a:t>
             </a:fld>
             <a:endParaRPr lang="en-US"/>
           </a:p>
@@ -2907,7 +2910,7 @@
           <a:p>
             <a:fld id="{CCF922D2-28BA-4741-BF87-E32CA0C16F1A}" type="datetimeFigureOut">
               <a:rPr lang="en-US" smtClean="0"/>
-              <a:t>12/24/2021</a:t>
+              <a:t>12/27/2021</a:t>
             </a:fld>
             <a:endParaRPr lang="en-US"/>
           </a:p>
@@ -3403,196 +3406,6 @@
 </file>
 
 <file path=ppt/slides/slide2.xml><?xml version="1.0" encoding="utf-8"?>
-<p:sld xmlns:a="http://schemas.openxmlformats.org/drawingml/2006/main" xmlns:r="http://schemas.openxmlformats.org/officeDocument/2006/relationships" xmlns:p="http://schemas.openxmlformats.org/presentationml/2006/main">
-  <p:cSld>
-    <p:spTree>
-      <p:nvGrpSpPr>
-        <p:cNvPr id="1" name=""/>
-        <p:cNvGrpSpPr/>
-        <p:nvPr/>
-      </p:nvGrpSpPr>
-      <p:grpSpPr>
-        <a:xfrm>
-          <a:off x="0" y="0"/>
-          <a:ext cx="0" cy="0"/>
-          <a:chOff x="0" y="0"/>
-          <a:chExt cx="0" cy="0"/>
-        </a:xfrm>
-      </p:grpSpPr>
-      <p:sp>
-        <p:nvSpPr>
-          <p:cNvPr id="10" name="TextBox 9">
-            <a:extLst>
-              <a:ext uri="{FF2B5EF4-FFF2-40B4-BE49-F238E27FC236}">
-                <a16:creationId xmlns:a16="http://schemas.microsoft.com/office/drawing/2014/main" id="{CB60ACBE-B5A7-4AAF-B0ED-909D76982966}"/>
-              </a:ext>
-            </a:extLst>
-          </p:cNvPr>
-          <p:cNvSpPr txBox="1"/>
-          <p:nvPr/>
-        </p:nvSpPr>
-        <p:spPr>
-          <a:xfrm>
-            <a:off x="259309" y="177421"/>
-            <a:ext cx="1528548" cy="523220"/>
-          </a:xfrm>
-          <a:prstGeom prst="rect">
-            <a:avLst/>
-          </a:prstGeom>
-          <a:noFill/>
-        </p:spPr>
-        <p:txBody>
-          <a:bodyPr wrap="square" rtlCol="0">
-            <a:spAutoFit/>
-          </a:bodyPr>
-          <a:lstStyle/>
-          <a:p>
-            <a:r>
-              <a:rPr lang="en-US" sz="2800" b="1" dirty="0"/>
-              <a:t>Choice 1</a:t>
-            </a:r>
-          </a:p>
-        </p:txBody>
-      </p:sp>
-      <p:pic>
-        <p:nvPicPr>
-          <p:cNvPr id="14" name="Picture 13">
-            <a:extLst>
-              <a:ext uri="{FF2B5EF4-FFF2-40B4-BE49-F238E27FC236}">
-                <a16:creationId xmlns:a16="http://schemas.microsoft.com/office/drawing/2014/main" id="{403B3666-E203-4BDF-A68D-308CD3C74463}"/>
-              </a:ext>
-            </a:extLst>
-          </p:cNvPr>
-          <p:cNvPicPr>
-            <a:picLocks noChangeAspect="1"/>
-          </p:cNvPicPr>
-          <p:nvPr/>
-        </p:nvPicPr>
-        <p:blipFill>
-          <a:blip r:embed="rId2"/>
-          <a:stretch>
-            <a:fillRect/>
-          </a:stretch>
-        </p:blipFill>
-        <p:spPr>
-          <a:xfrm>
-            <a:off x="3042811" y="785443"/>
-            <a:ext cx="6106377" cy="5287113"/>
-          </a:xfrm>
-          <a:prstGeom prst="rect">
-            <a:avLst/>
-          </a:prstGeom>
-        </p:spPr>
-      </p:pic>
-    </p:spTree>
-    <p:extLst>
-      <p:ext uri="{BB962C8B-B14F-4D97-AF65-F5344CB8AC3E}">
-        <p14:creationId xmlns:p14="http://schemas.microsoft.com/office/powerpoint/2010/main" val="1506392251"/>
-      </p:ext>
-    </p:extLst>
-  </p:cSld>
-  <p:clrMapOvr>
-    <a:masterClrMapping/>
-  </p:clrMapOvr>
-</p:sld>
-</file>
-
-<file path=ppt/slides/slide3.xml><?xml version="1.0" encoding="utf-8"?>
-<p:sld xmlns:a="http://schemas.openxmlformats.org/drawingml/2006/main" xmlns:r="http://schemas.openxmlformats.org/officeDocument/2006/relationships" xmlns:p="http://schemas.openxmlformats.org/presentationml/2006/main">
-  <p:cSld>
-    <p:spTree>
-      <p:nvGrpSpPr>
-        <p:cNvPr id="1" name=""/>
-        <p:cNvGrpSpPr/>
-        <p:nvPr/>
-      </p:nvGrpSpPr>
-      <p:grpSpPr>
-        <a:xfrm>
-          <a:off x="0" y="0"/>
-          <a:ext cx="0" cy="0"/>
-          <a:chOff x="0" y="0"/>
-          <a:chExt cx="0" cy="0"/>
-        </a:xfrm>
-      </p:grpSpPr>
-      <p:sp>
-        <p:nvSpPr>
-          <p:cNvPr id="4" name="TextBox 3">
-            <a:extLst>
-              <a:ext uri="{FF2B5EF4-FFF2-40B4-BE49-F238E27FC236}">
-                <a16:creationId xmlns:a16="http://schemas.microsoft.com/office/drawing/2014/main" id="{C80572A8-23CC-48D7-8E4C-33E040761DB9}"/>
-              </a:ext>
-            </a:extLst>
-          </p:cNvPr>
-          <p:cNvSpPr txBox="1"/>
-          <p:nvPr/>
-        </p:nvSpPr>
-        <p:spPr>
-          <a:xfrm>
-            <a:off x="259309" y="177421"/>
-            <a:ext cx="1528548" cy="523220"/>
-          </a:xfrm>
-          <a:prstGeom prst="rect">
-            <a:avLst/>
-          </a:prstGeom>
-          <a:noFill/>
-        </p:spPr>
-        <p:txBody>
-          <a:bodyPr wrap="square" rtlCol="0">
-            <a:spAutoFit/>
-          </a:bodyPr>
-          <a:lstStyle/>
-          <a:p>
-            <a:r>
-              <a:rPr lang="en-US" sz="2800" b="1" dirty="0"/>
-              <a:t>Choice 2</a:t>
-            </a:r>
-          </a:p>
-        </p:txBody>
-      </p:sp>
-      <p:pic>
-        <p:nvPicPr>
-          <p:cNvPr id="8" name="Picture 7">
-            <a:extLst>
-              <a:ext uri="{FF2B5EF4-FFF2-40B4-BE49-F238E27FC236}">
-                <a16:creationId xmlns:a16="http://schemas.microsoft.com/office/drawing/2014/main" id="{DA5CAF25-D771-4C33-A132-07834448F81B}"/>
-              </a:ext>
-            </a:extLst>
-          </p:cNvPr>
-          <p:cNvPicPr>
-            <a:picLocks noChangeAspect="1"/>
-          </p:cNvPicPr>
-          <p:nvPr/>
-        </p:nvPicPr>
-        <p:blipFill>
-          <a:blip r:embed="rId2"/>
-          <a:stretch>
-            <a:fillRect/>
-          </a:stretch>
-        </p:blipFill>
-        <p:spPr>
-          <a:xfrm>
-            <a:off x="3042811" y="756864"/>
-            <a:ext cx="6106377" cy="5344271"/>
-          </a:xfrm>
-          <a:prstGeom prst="rect">
-            <a:avLst/>
-          </a:prstGeom>
-        </p:spPr>
-      </p:pic>
-    </p:spTree>
-    <p:extLst>
-      <p:ext uri="{BB962C8B-B14F-4D97-AF65-F5344CB8AC3E}">
-        <p14:creationId xmlns:p14="http://schemas.microsoft.com/office/powerpoint/2010/main" val="1925505964"/>
-      </p:ext>
-    </p:extLst>
-  </p:cSld>
-  <p:clrMapOvr>
-    <a:masterClrMapping/>
-  </p:clrMapOvr>
-</p:sld>
-</file>
-
-<file path=ppt/slides/slide4.xml><?xml version="1.0" encoding="utf-8"?>
 <p:sld xmlns:a="http://schemas.openxmlformats.org/drawingml/2006/main" xmlns:r="http://schemas.openxmlformats.org/officeDocument/2006/relationships" xmlns:p="http://schemas.openxmlformats.org/presentationml/2006/main">
   <p:cSld>
     <p:spTree>

</xml_diff>